<commit_message>
:white_check_mark: Finish two-way replication
</commit_message>
<xml_diff>
--- a/23/yongki/Availability&Replication.pptx
+++ b/23/yongki/Availability&Replication.pptx
@@ -10377,10 +10377,10 @@
       </p:sp>
       <p:pic>
         <p:nvPicPr>
-          <p:cNvPr id="5" name="그림 4">
+          <p:cNvPr id="4" name="그림 3">
             <a:extLst>
               <a:ext uri="{FF2B5EF4-FFF2-40B4-BE49-F238E27FC236}">
-                <a16:creationId xmlns:a16="http://schemas.microsoft.com/office/drawing/2014/main" id="{EE23EE48-1913-A4B5-464F-A8D550840827}"/>
+                <a16:creationId xmlns:a16="http://schemas.microsoft.com/office/drawing/2014/main" id="{444E3ACA-7D90-579A-CB3A-B8E43E321EFB}"/>
               </a:ext>
             </a:extLst>
           </p:cNvPr>
@@ -10397,8 +10397,8 @@
         </p:blipFill>
         <p:spPr>
           <a:xfrm>
-            <a:off x="3131840" y="2173020"/>
-            <a:ext cx="3318954" cy="2850896"/>
+            <a:off x="2719129" y="2225219"/>
+            <a:ext cx="3705742" cy="2981741"/>
           </a:xfrm>
           <a:prstGeom prst="rect">
             <a:avLst/>
@@ -11366,10 +11366,10 @@
       </p:sp>
       <p:pic>
         <p:nvPicPr>
-          <p:cNvPr id="13" name="그림 12">
+          <p:cNvPr id="4" name="그림 3">
             <a:extLst>
               <a:ext uri="{FF2B5EF4-FFF2-40B4-BE49-F238E27FC236}">
-                <a16:creationId xmlns:a16="http://schemas.microsoft.com/office/drawing/2014/main" id="{A9C23A3D-286E-4F5C-6048-99BB9E26CF7A}"/>
+                <a16:creationId xmlns:a16="http://schemas.microsoft.com/office/drawing/2014/main" id="{84F4CD9A-3F8A-27D5-289E-C42C8D0CD092}"/>
               </a:ext>
             </a:extLst>
           </p:cNvPr>
@@ -11386,8 +11386,8 @@
         </p:blipFill>
         <p:spPr>
           <a:xfrm>
-            <a:off x="3131840" y="3284984"/>
-            <a:ext cx="3318954" cy="2850896"/>
+            <a:off x="2719129" y="3140968"/>
+            <a:ext cx="3705742" cy="2981741"/>
           </a:xfrm>
           <a:prstGeom prst="rect">
             <a:avLst/>
@@ -15280,10 +15280,10 @@
       </p:sp>
       <p:pic>
         <p:nvPicPr>
-          <p:cNvPr id="5" name="그림 4">
+          <p:cNvPr id="4" name="그림 3">
             <a:extLst>
               <a:ext uri="{FF2B5EF4-FFF2-40B4-BE49-F238E27FC236}">
-                <a16:creationId xmlns:a16="http://schemas.microsoft.com/office/drawing/2014/main" id="{EE23EE48-1913-A4B5-464F-A8D550840827}"/>
+                <a16:creationId xmlns:a16="http://schemas.microsoft.com/office/drawing/2014/main" id="{123B5B07-F302-5D25-3989-11EAC2155BE9}"/>
               </a:ext>
             </a:extLst>
           </p:cNvPr>
@@ -15300,8 +15300,8 @@
         </p:blipFill>
         <p:spPr>
           <a:xfrm>
-            <a:off x="3131840" y="3068960"/>
-            <a:ext cx="3318954" cy="2850896"/>
+            <a:off x="2719129" y="3140968"/>
+            <a:ext cx="3705742" cy="2981741"/>
           </a:xfrm>
           <a:prstGeom prst="rect">
             <a:avLst/>

</xml_diff>